<commit_message>
AgileDotNet2013 - Slide changes
</commit_message>
<xml_diff>
--- a/MamaSaidTestYourCode/AgileDotNet2013/Mama Said Test Your Code.pptx
+++ b/MamaSaidTestYourCode/AgileDotNet2013/Mama Said Test Your Code.pptx
@@ -8432,7 +8432,9 @@
         </p:nvSpPr>
         <p:spPr/>
         <p:txBody>
-          <a:bodyPr/>
+          <a:bodyPr>
+            <a:normAutofit fontScale="92500" lnSpcReduction="20000"/>
+          </a:bodyPr>
           <a:lstStyle/>
           <a:p>
             <a:r>
@@ -8462,23 +8464,79 @@
             <a:endParaRPr lang="en-US" dirty="0"/>
           </a:p>
           <a:p>
-            <a:r>
-              <a:rPr lang="en-US" dirty="0" err="1" smtClean="0"/>
-              <a:t>QUnit</a:t>
-            </a:r>
-            <a:r>
-              <a:rPr lang="en-US" dirty="0" err="1" smtClean="0"/>
-              <a:t>Metro</a:t>
-            </a:r>
+            <a:endParaRPr lang="en-US" dirty="0" smtClean="0"/>
+          </a:p>
+          <a:p>
             <a:r>
               <a:rPr lang="en-US" dirty="0" smtClean="0"/>
-              <a:t> - </a:t>
+              <a:t>Slides &amp; Code Samples </a:t>
+            </a:r>
+            <a:r>
+              <a:rPr lang="en-US" dirty="0"/>
+              <a:t>- </a:t>
             </a:r>
             <a:r>
               <a:rPr lang="en-US" dirty="0">
                 <a:hlinkClick r:id="rId3"/>
               </a:rPr>
-              <a:t>http://qunitmetro.github.io/QUnitMetro/</a:t>
+              <a:t>http://bit.ly/1ewKVuj</a:t>
+            </a:r>
+            <a:endParaRPr lang="en-US" dirty="0"/>
+          </a:p>
+          <a:p>
+            <a:r>
+              <a:rPr lang="en-US" dirty="0" err="1" smtClean="0"/>
+              <a:t>QUnit</a:t>
+            </a:r>
+            <a:r>
+              <a:rPr lang="en-US" dirty="0" err="1" smtClean="0"/>
+              <a:t>Metro</a:t>
+            </a:r>
+            <a:r>
+              <a:rPr lang="en-US" dirty="0" smtClean="0"/>
+              <a:t> - </a:t>
+            </a:r>
+            <a:r>
+              <a:rPr lang="en-US" dirty="0">
+                <a:hlinkClick r:id="rId4"/>
+              </a:rPr>
+              <a:t>http://qunitmetro.github.io/QUnitMetro</a:t>
+            </a:r>
+            <a:r>
+              <a:rPr lang="en-US" dirty="0" smtClean="0">
+                <a:hlinkClick r:id="rId4"/>
+              </a:rPr>
+              <a:t>/</a:t>
+            </a:r>
+            <a:endParaRPr lang="en-US" dirty="0" smtClean="0"/>
+          </a:p>
+          <a:p>
+            <a:r>
+              <a:rPr lang="en-US" dirty="0" err="1" smtClean="0"/>
+              <a:t>Qunit</a:t>
+            </a:r>
+            <a:r>
+              <a:rPr lang="en-US" dirty="0"/>
+              <a:t> Walkthrough - </a:t>
+            </a:r>
+            <a:r>
+              <a:rPr lang="en-US" dirty="0">
+                <a:hlinkClick r:id="rId5"/>
+              </a:rPr>
+              <a:t>http://bit.ly/9IuVo5</a:t>
+            </a:r>
+            <a:endParaRPr lang="en-US" dirty="0" smtClean="0"/>
+          </a:p>
+          <a:p>
+            <a:r>
+              <a:rPr lang="en-US" dirty="0" smtClean="0"/>
+              <a:t>Walkthrough on unit tests - </a:t>
+            </a:r>
+            <a:r>
+              <a:rPr lang="en-US" dirty="0">
+                <a:hlinkClick r:id="rId6"/>
+              </a:rPr>
+              <a:t>http://bit.ly/18ZcTy8</a:t>
             </a:r>
             <a:endParaRPr lang="en-US" dirty="0"/>
           </a:p>

</xml_diff>